<commit_message>
edited the level 1 block diagram for overal system
</commit_message>
<xml_diff>
--- a/Block Diagram/HW5_BlockDiagrams.pptx
+++ b/Block Diagram/HW5_BlockDiagrams.pptx
@@ -105,6 +105,11 @@
       </a:defRPr>
     </a:lvl9pPr>
   </p:defaultTextStyle>
+  <p:extLst>
+    <p:ext uri="{EFAFB233-063F-42B5-8137-9DF3F51BA10A}">
+      <p15:sldGuideLst xmlns:p15="http://schemas.microsoft.com/office/powerpoint/2012/main"/>
+    </p:ext>
+  </p:extLst>
 </p:presentation>
 </file>
 
@@ -239,7 +244,7 @@
           <a:p>
             <a:fld id="{00E37F5A-95EC-4F7A-9848-EEB36B306290}" type="datetimeFigureOut">
               <a:rPr lang="en-US" smtClean="0"/>
-              <a:t>11/8/2015</a:t>
+              <a:t>11/14/2015</a:t>
             </a:fld>
             <a:endParaRPr lang="en-US"/>
           </a:p>
@@ -409,7 +414,7 @@
           <a:p>
             <a:fld id="{00E37F5A-95EC-4F7A-9848-EEB36B306290}" type="datetimeFigureOut">
               <a:rPr lang="en-US" smtClean="0"/>
-              <a:t>11/8/2015</a:t>
+              <a:t>11/14/2015</a:t>
             </a:fld>
             <a:endParaRPr lang="en-US"/>
           </a:p>
@@ -589,7 +594,7 @@
           <a:p>
             <a:fld id="{00E37F5A-95EC-4F7A-9848-EEB36B306290}" type="datetimeFigureOut">
               <a:rPr lang="en-US" smtClean="0"/>
-              <a:t>11/8/2015</a:t>
+              <a:t>11/14/2015</a:t>
             </a:fld>
             <a:endParaRPr lang="en-US"/>
           </a:p>
@@ -759,7 +764,7 @@
           <a:p>
             <a:fld id="{00E37F5A-95EC-4F7A-9848-EEB36B306290}" type="datetimeFigureOut">
               <a:rPr lang="en-US" smtClean="0"/>
-              <a:t>11/8/2015</a:t>
+              <a:t>11/14/2015</a:t>
             </a:fld>
             <a:endParaRPr lang="en-US"/>
           </a:p>
@@ -1005,7 +1010,7 @@
           <a:p>
             <a:fld id="{00E37F5A-95EC-4F7A-9848-EEB36B306290}" type="datetimeFigureOut">
               <a:rPr lang="en-US" smtClean="0"/>
-              <a:t>11/8/2015</a:t>
+              <a:t>11/14/2015</a:t>
             </a:fld>
             <a:endParaRPr lang="en-US"/>
           </a:p>
@@ -1237,7 +1242,7 @@
           <a:p>
             <a:fld id="{00E37F5A-95EC-4F7A-9848-EEB36B306290}" type="datetimeFigureOut">
               <a:rPr lang="en-US" smtClean="0"/>
-              <a:t>11/8/2015</a:t>
+              <a:t>11/14/2015</a:t>
             </a:fld>
             <a:endParaRPr lang="en-US"/>
           </a:p>
@@ -1604,7 +1609,7 @@
           <a:p>
             <a:fld id="{00E37F5A-95EC-4F7A-9848-EEB36B306290}" type="datetimeFigureOut">
               <a:rPr lang="en-US" smtClean="0"/>
-              <a:t>11/8/2015</a:t>
+              <a:t>11/14/2015</a:t>
             </a:fld>
             <a:endParaRPr lang="en-US"/>
           </a:p>
@@ -1722,7 +1727,7 @@
           <a:p>
             <a:fld id="{00E37F5A-95EC-4F7A-9848-EEB36B306290}" type="datetimeFigureOut">
               <a:rPr lang="en-US" smtClean="0"/>
-              <a:t>11/8/2015</a:t>
+              <a:t>11/14/2015</a:t>
             </a:fld>
             <a:endParaRPr lang="en-US"/>
           </a:p>
@@ -1817,7 +1822,7 @@
           <a:p>
             <a:fld id="{00E37F5A-95EC-4F7A-9848-EEB36B306290}" type="datetimeFigureOut">
               <a:rPr lang="en-US" smtClean="0"/>
-              <a:t>11/8/2015</a:t>
+              <a:t>11/14/2015</a:t>
             </a:fld>
             <a:endParaRPr lang="en-US"/>
           </a:p>
@@ -2094,7 +2099,7 @@
           <a:p>
             <a:fld id="{00E37F5A-95EC-4F7A-9848-EEB36B306290}" type="datetimeFigureOut">
               <a:rPr lang="en-US" smtClean="0"/>
-              <a:t>11/8/2015</a:t>
+              <a:t>11/14/2015</a:t>
             </a:fld>
             <a:endParaRPr lang="en-US"/>
           </a:p>
@@ -2347,7 +2352,7 @@
           <a:p>
             <a:fld id="{00E37F5A-95EC-4F7A-9848-EEB36B306290}" type="datetimeFigureOut">
               <a:rPr lang="en-US" smtClean="0"/>
-              <a:t>11/8/2015</a:t>
+              <a:t>11/14/2015</a:t>
             </a:fld>
             <a:endParaRPr lang="en-US"/>
           </a:p>
@@ -2560,7 +2565,7 @@
           <a:p>
             <a:fld id="{00E37F5A-95EC-4F7A-9848-EEB36B306290}" type="datetimeFigureOut">
               <a:rPr lang="en-US" smtClean="0"/>
-              <a:t>11/8/2015</a:t>
+              <a:t>11/14/2015</a:t>
             </a:fld>
             <a:endParaRPr lang="en-US"/>
           </a:p>
@@ -3271,6 +3276,13 @@
   <p:clrMapOvr>
     <a:masterClrMapping/>
   </p:clrMapOvr>
+  <p:timing>
+    <p:tnLst>
+      <p:par>
+        <p:cTn id="1" dur="indefinite" restart="never" nodeType="tmRoot"/>
+      </p:par>
+    </p:tnLst>
+  </p:timing>
 </p:sld>
 </file>
 
@@ -3299,8 +3311,8 @@
         </p:nvSpPr>
         <p:spPr>
           <a:xfrm>
-            <a:off x="1371600" y="942974"/>
-            <a:ext cx="9686925" cy="5038726"/>
+            <a:off x="1363588" y="952500"/>
+            <a:ext cx="9694937" cy="5038726"/>
           </a:xfrm>
           <a:prstGeom prst="rect">
             <a:avLst/>
@@ -3347,12 +3359,20 @@
         </p:nvSpPr>
         <p:spPr>
           <a:xfrm>
-            <a:off x="1866900" y="1404937"/>
+            <a:off x="3873672" y="1440575"/>
             <a:ext cx="1428750" cy="1028700"/>
           </a:xfrm>
           <a:prstGeom prst="rect">
             <a:avLst/>
           </a:prstGeom>
+          <a:solidFill>
+            <a:schemeClr val="bg1"/>
+          </a:solidFill>
+          <a:ln>
+            <a:solidFill>
+              <a:schemeClr val="tx1"/>
+            </a:solidFill>
+          </a:ln>
         </p:spPr>
         <p:style>
           <a:lnRef idx="2">
@@ -3376,10 +3396,18 @@
           <a:p>
             <a:pPr algn="ctr"/>
             <a:r>
-              <a:rPr lang="en-US" sz="1600" dirty="0" smtClean="0"/>
+              <a:rPr lang="en-US" sz="1600" dirty="0" smtClean="0">
+                <a:solidFill>
+                  <a:schemeClr val="tx1"/>
+                </a:solidFill>
+              </a:rPr>
               <a:t>Position Calculation</a:t>
             </a:r>
-            <a:endParaRPr lang="en-US" sz="1600" dirty="0"/>
+            <a:endParaRPr lang="en-US" sz="1600" dirty="0">
+              <a:solidFill>
+                <a:schemeClr val="tx1"/>
+              </a:solidFill>
+            </a:endParaRPr>
           </a:p>
         </p:txBody>
       </p:sp>
@@ -3391,12 +3419,20 @@
         </p:nvSpPr>
         <p:spPr>
           <a:xfrm>
-            <a:off x="6462712" y="1419223"/>
+            <a:off x="5748337" y="2954740"/>
             <a:ext cx="1428750" cy="1028700"/>
           </a:xfrm>
           <a:prstGeom prst="rect">
             <a:avLst/>
           </a:prstGeom>
+          <a:solidFill>
+            <a:schemeClr val="bg1"/>
+          </a:solidFill>
+          <a:ln>
+            <a:solidFill>
+              <a:schemeClr val="tx1"/>
+            </a:solidFill>
+          </a:ln>
         </p:spPr>
         <p:style>
           <a:lnRef idx="2">
@@ -3420,10 +3456,18 @@
           <a:p>
             <a:pPr algn="ctr"/>
             <a:r>
-              <a:rPr lang="en-US" sz="1600" dirty="0" smtClean="0"/>
+              <a:rPr lang="en-US" sz="1600" dirty="0" smtClean="0">
+                <a:solidFill>
+                  <a:schemeClr val="tx1"/>
+                </a:solidFill>
+              </a:rPr>
               <a:t>Servo Controller</a:t>
             </a:r>
-            <a:endParaRPr lang="en-US" sz="1600" dirty="0"/>
+            <a:endParaRPr lang="en-US" sz="1600" dirty="0">
+              <a:solidFill>
+                <a:schemeClr val="tx1"/>
+              </a:solidFill>
+            </a:endParaRPr>
           </a:p>
         </p:txBody>
       </p:sp>
@@ -3435,12 +3479,20 @@
         </p:nvSpPr>
         <p:spPr>
           <a:xfrm>
-            <a:off x="2016125" y="3729038"/>
+            <a:off x="1866900" y="3462337"/>
             <a:ext cx="1428750" cy="1028700"/>
           </a:xfrm>
           <a:prstGeom prst="rect">
             <a:avLst/>
           </a:prstGeom>
+          <a:solidFill>
+            <a:schemeClr val="bg1"/>
+          </a:solidFill>
+          <a:ln>
+            <a:solidFill>
+              <a:schemeClr val="tx1"/>
+            </a:solidFill>
+          </a:ln>
         </p:spPr>
         <p:style>
           <a:lnRef idx="2">
@@ -3464,17 +3516,29 @@
           <a:p>
             <a:pPr algn="ctr"/>
             <a:r>
-              <a:rPr lang="en-US" sz="1600" dirty="0" smtClean="0"/>
+              <a:rPr lang="en-US" sz="1600" dirty="0" smtClean="0">
+                <a:solidFill>
+                  <a:schemeClr val="tx1"/>
+                </a:solidFill>
+              </a:rPr>
               <a:t>Voltage Regulator </a:t>
             </a:r>
           </a:p>
           <a:p>
             <a:pPr algn="ctr"/>
             <a:r>
-              <a:rPr lang="en-US" sz="1600" dirty="0" smtClean="0"/>
+              <a:rPr lang="en-US" sz="1600" dirty="0" smtClean="0">
+                <a:solidFill>
+                  <a:schemeClr val="tx1"/>
+                </a:solidFill>
+              </a:rPr>
               <a:t>6V to 3.3V</a:t>
             </a:r>
-            <a:endParaRPr lang="en-US" sz="1600" dirty="0"/>
+            <a:endParaRPr lang="en-US" sz="1600" dirty="0">
+              <a:solidFill>
+                <a:schemeClr val="tx1"/>
+              </a:solidFill>
+            </a:endParaRPr>
           </a:p>
         </p:txBody>
       </p:sp>
@@ -3486,12 +3550,20 @@
         </p:nvSpPr>
         <p:spPr>
           <a:xfrm>
-            <a:off x="9153525" y="4243388"/>
+            <a:off x="5767387" y="4348404"/>
             <a:ext cx="1409700" cy="1028700"/>
           </a:xfrm>
           <a:prstGeom prst="rect">
             <a:avLst/>
           </a:prstGeom>
+          <a:solidFill>
+            <a:schemeClr val="bg1"/>
+          </a:solidFill>
+          <a:ln>
+            <a:solidFill>
+              <a:schemeClr val="tx1"/>
+            </a:solidFill>
+          </a:ln>
         </p:spPr>
         <p:style>
           <a:lnRef idx="2">
@@ -3515,10 +3587,18 @@
           <a:p>
             <a:pPr algn="ctr"/>
             <a:r>
-              <a:rPr lang="en-US" sz="1600" dirty="0" smtClean="0"/>
+              <a:rPr lang="en-US" sz="1600" dirty="0" smtClean="0">
+                <a:solidFill>
+                  <a:schemeClr val="tx1"/>
+                </a:solidFill>
+              </a:rPr>
               <a:t>LED Strip</a:t>
             </a:r>
-            <a:endParaRPr lang="en-US" sz="1600" dirty="0"/>
+            <a:endParaRPr lang="en-US" sz="1600" dirty="0">
+              <a:solidFill>
+                <a:schemeClr val="tx1"/>
+              </a:solidFill>
+            </a:endParaRPr>
           </a:p>
         </p:txBody>
       </p:sp>
@@ -3530,12 +3610,20 @@
         </p:nvSpPr>
         <p:spPr>
           <a:xfrm>
-            <a:off x="9544047" y="1269204"/>
+            <a:off x="7833253" y="2615981"/>
             <a:ext cx="1019175" cy="419102"/>
           </a:xfrm>
           <a:prstGeom prst="rect">
             <a:avLst/>
           </a:prstGeom>
+          <a:solidFill>
+            <a:schemeClr val="bg1"/>
+          </a:solidFill>
+          <a:ln>
+            <a:solidFill>
+              <a:schemeClr val="tx1"/>
+            </a:solidFill>
+          </a:ln>
         </p:spPr>
         <p:style>
           <a:lnRef idx="2">
@@ -3559,10 +3647,18 @@
           <a:p>
             <a:pPr algn="ctr"/>
             <a:r>
-              <a:rPr lang="en-US" sz="1600" dirty="0" smtClean="0"/>
+              <a:rPr lang="en-US" sz="1600" dirty="0" smtClean="0">
+                <a:solidFill>
+                  <a:schemeClr val="tx1"/>
+                </a:solidFill>
+              </a:rPr>
               <a:t>Servo 1</a:t>
             </a:r>
-            <a:endParaRPr lang="en-US" sz="1600" dirty="0"/>
+            <a:endParaRPr lang="en-US" sz="1600" dirty="0">
+              <a:solidFill>
+                <a:schemeClr val="tx1"/>
+              </a:solidFill>
+            </a:endParaRPr>
           </a:p>
         </p:txBody>
       </p:sp>
@@ -3574,12 +3670,20 @@
         </p:nvSpPr>
         <p:spPr>
           <a:xfrm>
-            <a:off x="5811837" y="4243388"/>
+            <a:off x="1866900" y="4722018"/>
             <a:ext cx="1428750" cy="1028700"/>
           </a:xfrm>
           <a:prstGeom prst="rect">
             <a:avLst/>
           </a:prstGeom>
+          <a:solidFill>
+            <a:schemeClr val="bg1"/>
+          </a:solidFill>
+          <a:ln>
+            <a:solidFill>
+              <a:schemeClr val="tx1"/>
+            </a:solidFill>
+          </a:ln>
         </p:spPr>
         <p:style>
           <a:lnRef idx="2">
@@ -3603,14 +3707,22 @@
           <a:p>
             <a:pPr algn="ctr"/>
             <a:r>
-              <a:rPr lang="en-US" sz="1600" dirty="0" smtClean="0"/>
+              <a:rPr lang="en-US" sz="1600" dirty="0" smtClean="0">
+                <a:solidFill>
+                  <a:schemeClr val="tx1"/>
+                </a:solidFill>
+              </a:rPr>
               <a:t>Voltage Limiting Circuit</a:t>
             </a:r>
           </a:p>
           <a:p>
             <a:pPr algn="ctr"/>
             <a:r>
-              <a:rPr lang="en-US" sz="1600" dirty="0" smtClean="0"/>
+              <a:rPr lang="en-US" sz="1600" dirty="0" smtClean="0">
+                <a:solidFill>
+                  <a:schemeClr val="tx1"/>
+                </a:solidFill>
+              </a:rPr>
               <a:t>6V to 5V</a:t>
             </a:r>
           </a:p>
@@ -3657,12 +3769,20 @@
         </p:nvSpPr>
         <p:spPr>
           <a:xfrm>
-            <a:off x="9544047" y="1804985"/>
+            <a:off x="7833253" y="3244906"/>
             <a:ext cx="1019175" cy="419102"/>
           </a:xfrm>
           <a:prstGeom prst="rect">
             <a:avLst/>
           </a:prstGeom>
+          <a:solidFill>
+            <a:schemeClr val="bg1"/>
+          </a:solidFill>
+          <a:ln>
+            <a:solidFill>
+              <a:schemeClr val="tx1"/>
+            </a:solidFill>
+          </a:ln>
         </p:spPr>
         <p:style>
           <a:lnRef idx="2">
@@ -3686,10 +3806,18 @@
           <a:p>
             <a:pPr algn="ctr"/>
             <a:r>
-              <a:rPr lang="en-US" sz="1600" dirty="0" smtClean="0"/>
+              <a:rPr lang="en-US" sz="1600" dirty="0" smtClean="0">
+                <a:solidFill>
+                  <a:schemeClr val="tx1"/>
+                </a:solidFill>
+              </a:rPr>
               <a:t>Servo 2</a:t>
             </a:r>
-            <a:endParaRPr lang="en-US" sz="1600" dirty="0"/>
+            <a:endParaRPr lang="en-US" sz="1600" dirty="0">
+              <a:solidFill>
+                <a:schemeClr val="tx1"/>
+              </a:solidFill>
+            </a:endParaRPr>
           </a:p>
         </p:txBody>
       </p:sp>
@@ -3701,12 +3829,20 @@
         </p:nvSpPr>
         <p:spPr>
           <a:xfrm>
-            <a:off x="9544047" y="2326474"/>
+            <a:off x="7833253" y="3873559"/>
             <a:ext cx="1019175" cy="419102"/>
           </a:xfrm>
           <a:prstGeom prst="rect">
             <a:avLst/>
           </a:prstGeom>
+          <a:solidFill>
+            <a:schemeClr val="bg1"/>
+          </a:solidFill>
+          <a:ln>
+            <a:solidFill>
+              <a:schemeClr val="tx1"/>
+            </a:solidFill>
+          </a:ln>
         </p:spPr>
         <p:style>
           <a:lnRef idx="2">
@@ -3730,10 +3866,1294 @@
           <a:p>
             <a:pPr algn="ctr"/>
             <a:r>
-              <a:rPr lang="en-US" sz="1600" dirty="0" smtClean="0"/>
+              <a:rPr lang="en-US" sz="1600" dirty="0" smtClean="0">
+                <a:solidFill>
+                  <a:schemeClr val="tx1"/>
+                </a:solidFill>
+              </a:rPr>
               <a:t>Servo 3</a:t>
             </a:r>
-            <a:endParaRPr lang="en-US" sz="1600" dirty="0"/>
+            <a:endParaRPr lang="en-US" sz="1600" dirty="0">
+              <a:solidFill>
+                <a:schemeClr val="tx1"/>
+              </a:solidFill>
+            </a:endParaRPr>
+          </a:p>
+        </p:txBody>
+      </p:sp>
+      <p:sp>
+        <p:nvSpPr>
+          <p:cNvPr id="14" name="TextBox 13"/>
+          <p:cNvSpPr txBox="1"/>
+          <p:nvPr/>
+        </p:nvSpPr>
+        <p:spPr>
+          <a:xfrm>
+            <a:off x="0" y="1577756"/>
+            <a:ext cx="1173335" cy="646331"/>
+          </a:xfrm>
+          <a:prstGeom prst="rect">
+            <a:avLst/>
+          </a:prstGeom>
+          <a:noFill/>
+        </p:spPr>
+        <p:txBody>
+          <a:bodyPr wrap="none" rtlCol="0">
+            <a:spAutoFit/>
+          </a:bodyPr>
+          <a:lstStyle/>
+          <a:p>
+            <a:pPr algn="ctr"/>
+            <a:r>
+              <a:rPr lang="en-US" dirty="0" smtClean="0"/>
+              <a:t>Table Base</a:t>
+            </a:r>
+          </a:p>
+          <a:p>
+            <a:pPr algn="ctr"/>
+            <a:r>
+              <a:rPr lang="en-US" dirty="0" smtClean="0"/>
+              <a:t>Angle</a:t>
+            </a:r>
+            <a:endParaRPr lang="en-US" dirty="0"/>
+          </a:p>
+        </p:txBody>
+      </p:sp>
+      <p:cxnSp>
+        <p:nvCxnSpPr>
+          <p:cNvPr id="15" name="Straight Arrow Connector 14"/>
+          <p:cNvCxnSpPr>
+            <a:stCxn id="14" idx="3"/>
+          </p:cNvCxnSpPr>
+          <p:nvPr/>
+        </p:nvCxnSpPr>
+        <p:spPr>
+          <a:xfrm>
+            <a:off x="1173335" y="1900922"/>
+            <a:ext cx="198265" cy="0"/>
+          </a:xfrm>
+          <a:prstGeom prst="straightConnector1">
+            <a:avLst/>
+          </a:prstGeom>
+          <a:ln>
+            <a:headEnd type="none" w="med" len="med"/>
+            <a:tailEnd type="arrow" w="med" len="med"/>
+          </a:ln>
+        </p:spPr>
+        <p:style>
+          <a:lnRef idx="3">
+            <a:schemeClr val="dk1"/>
+          </a:lnRef>
+          <a:fillRef idx="0">
+            <a:schemeClr val="dk1"/>
+          </a:fillRef>
+          <a:effectRef idx="2">
+            <a:schemeClr val="dk1"/>
+          </a:effectRef>
+          <a:fontRef idx="minor">
+            <a:schemeClr val="tx1"/>
+          </a:fontRef>
+        </p:style>
+      </p:cxnSp>
+      <p:sp>
+        <p:nvSpPr>
+          <p:cNvPr id="17" name="TextBox 16"/>
+          <p:cNvSpPr txBox="1"/>
+          <p:nvPr/>
+        </p:nvSpPr>
+        <p:spPr>
+          <a:xfrm>
+            <a:off x="149737" y="3702073"/>
+            <a:ext cx="816121" cy="646331"/>
+          </a:xfrm>
+          <a:prstGeom prst="rect">
+            <a:avLst/>
+          </a:prstGeom>
+          <a:noFill/>
+        </p:spPr>
+        <p:txBody>
+          <a:bodyPr wrap="none" rtlCol="0">
+            <a:spAutoFit/>
+          </a:bodyPr>
+          <a:lstStyle/>
+          <a:p>
+            <a:r>
+              <a:rPr lang="en-US" dirty="0" smtClean="0"/>
+              <a:t>Power,</a:t>
+            </a:r>
+          </a:p>
+          <a:p>
+            <a:r>
+              <a:rPr lang="en-US" dirty="0" smtClean="0"/>
+              <a:t>6 VDC</a:t>
+            </a:r>
+            <a:endParaRPr lang="en-US" dirty="0"/>
+          </a:p>
+        </p:txBody>
+      </p:sp>
+      <p:cxnSp>
+        <p:nvCxnSpPr>
+          <p:cNvPr id="18" name="Straight Arrow Connector 17"/>
+          <p:cNvCxnSpPr>
+            <a:stCxn id="17" idx="3"/>
+          </p:cNvCxnSpPr>
+          <p:nvPr/>
+        </p:nvCxnSpPr>
+        <p:spPr>
+          <a:xfrm flipV="1">
+            <a:off x="965858" y="4025238"/>
+            <a:ext cx="397730" cy="1"/>
+          </a:xfrm>
+          <a:prstGeom prst="straightConnector1">
+            <a:avLst/>
+          </a:prstGeom>
+          <a:ln>
+            <a:headEnd type="none" w="med" len="med"/>
+            <a:tailEnd type="arrow" w="med" len="med"/>
+          </a:ln>
+        </p:spPr>
+        <p:style>
+          <a:lnRef idx="3">
+            <a:schemeClr val="dk1"/>
+          </a:lnRef>
+          <a:fillRef idx="0">
+            <a:schemeClr val="dk1"/>
+          </a:fillRef>
+          <a:effectRef idx="2">
+            <a:schemeClr val="dk1"/>
+          </a:effectRef>
+          <a:fontRef idx="minor">
+            <a:schemeClr val="tx1"/>
+          </a:fontRef>
+        </p:style>
+      </p:cxnSp>
+      <p:cxnSp>
+        <p:nvCxnSpPr>
+          <p:cNvPr id="53" name="Straight Connector 52"/>
+          <p:cNvCxnSpPr/>
+          <p:nvPr/>
+        </p:nvCxnSpPr>
+        <p:spPr>
+          <a:xfrm>
+            <a:off x="1371600" y="4025238"/>
+            <a:ext cx="238715" cy="0"/>
+          </a:xfrm>
+          <a:prstGeom prst="line">
+            <a:avLst/>
+          </a:prstGeom>
+          <a:ln>
+            <a:solidFill>
+              <a:schemeClr val="tx1"/>
+            </a:solidFill>
+          </a:ln>
+        </p:spPr>
+        <p:style>
+          <a:lnRef idx="1">
+            <a:schemeClr val="accent1"/>
+          </a:lnRef>
+          <a:fillRef idx="0">
+            <a:schemeClr val="accent1"/>
+          </a:fillRef>
+          <a:effectRef idx="0">
+            <a:schemeClr val="accent1"/>
+          </a:effectRef>
+          <a:fontRef idx="minor">
+            <a:schemeClr val="tx1"/>
+          </a:fontRef>
+        </p:style>
+      </p:cxnSp>
+      <p:cxnSp>
+        <p:nvCxnSpPr>
+          <p:cNvPr id="55" name="Straight Connector 54"/>
+          <p:cNvCxnSpPr/>
+          <p:nvPr/>
+        </p:nvCxnSpPr>
+        <p:spPr>
+          <a:xfrm>
+            <a:off x="1610315" y="4025238"/>
+            <a:ext cx="0" cy="1211130"/>
+          </a:xfrm>
+          <a:prstGeom prst="line">
+            <a:avLst/>
+          </a:prstGeom>
+          <a:ln>
+            <a:solidFill>
+              <a:schemeClr val="tx1"/>
+            </a:solidFill>
+          </a:ln>
+        </p:spPr>
+        <p:style>
+          <a:lnRef idx="1">
+            <a:schemeClr val="accent1"/>
+          </a:lnRef>
+          <a:fillRef idx="0">
+            <a:schemeClr val="accent1"/>
+          </a:fillRef>
+          <a:effectRef idx="0">
+            <a:schemeClr val="accent1"/>
+          </a:effectRef>
+          <a:fontRef idx="minor">
+            <a:schemeClr val="tx1"/>
+          </a:fontRef>
+        </p:style>
+      </p:cxnSp>
+      <p:cxnSp>
+        <p:nvCxnSpPr>
+          <p:cNvPr id="57" name="Straight Arrow Connector 56"/>
+          <p:cNvCxnSpPr/>
+          <p:nvPr/>
+        </p:nvCxnSpPr>
+        <p:spPr>
+          <a:xfrm>
+            <a:off x="1610315" y="5236368"/>
+            <a:ext cx="256585" cy="0"/>
+          </a:xfrm>
+          <a:prstGeom prst="straightConnector1">
+            <a:avLst/>
+          </a:prstGeom>
+          <a:ln>
+            <a:solidFill>
+              <a:schemeClr val="tx1"/>
+            </a:solidFill>
+            <a:tailEnd type="triangle"/>
+          </a:ln>
+        </p:spPr>
+        <p:style>
+          <a:lnRef idx="1">
+            <a:schemeClr val="accent1"/>
+          </a:lnRef>
+          <a:fillRef idx="0">
+            <a:schemeClr val="accent1"/>
+          </a:fillRef>
+          <a:effectRef idx="0">
+            <a:schemeClr val="accent1"/>
+          </a:effectRef>
+          <a:fontRef idx="minor">
+            <a:schemeClr val="tx1"/>
+          </a:fontRef>
+        </p:style>
+      </p:cxnSp>
+      <p:cxnSp>
+        <p:nvCxnSpPr>
+          <p:cNvPr id="59" name="Straight Arrow Connector 58"/>
+          <p:cNvCxnSpPr/>
+          <p:nvPr/>
+        </p:nvCxnSpPr>
+        <p:spPr>
+          <a:xfrm>
+            <a:off x="1610315" y="4025238"/>
+            <a:ext cx="256585" cy="0"/>
+          </a:xfrm>
+          <a:prstGeom prst="straightConnector1">
+            <a:avLst/>
+          </a:prstGeom>
+          <a:ln>
+            <a:solidFill>
+              <a:schemeClr val="tx1"/>
+            </a:solidFill>
+            <a:tailEnd type="triangle"/>
+          </a:ln>
+        </p:spPr>
+        <p:style>
+          <a:lnRef idx="1">
+            <a:schemeClr val="accent1"/>
+          </a:lnRef>
+          <a:fillRef idx="0">
+            <a:schemeClr val="accent1"/>
+          </a:fillRef>
+          <a:effectRef idx="0">
+            <a:schemeClr val="accent1"/>
+          </a:effectRef>
+          <a:fontRef idx="minor">
+            <a:schemeClr val="tx1"/>
+          </a:fontRef>
+        </p:style>
+      </p:cxnSp>
+      <p:cxnSp>
+        <p:nvCxnSpPr>
+          <p:cNvPr id="63" name="Straight Connector 62"/>
+          <p:cNvCxnSpPr>
+            <a:stCxn id="7" idx="0"/>
+          </p:cNvCxnSpPr>
+          <p:nvPr/>
+        </p:nvCxnSpPr>
+        <p:spPr>
+          <a:xfrm flipV="1">
+            <a:off x="2581275" y="2224087"/>
+            <a:ext cx="0" cy="1238250"/>
+          </a:xfrm>
+          <a:prstGeom prst="line">
+            <a:avLst/>
+          </a:prstGeom>
+          <a:ln>
+            <a:solidFill>
+              <a:schemeClr val="tx1"/>
+            </a:solidFill>
+          </a:ln>
+        </p:spPr>
+        <p:style>
+          <a:lnRef idx="1">
+            <a:schemeClr val="accent1"/>
+          </a:lnRef>
+          <a:fillRef idx="0">
+            <a:schemeClr val="accent1"/>
+          </a:fillRef>
+          <a:effectRef idx="0">
+            <a:schemeClr val="accent1"/>
+          </a:effectRef>
+          <a:fontRef idx="minor">
+            <a:schemeClr val="tx1"/>
+          </a:fontRef>
+        </p:style>
+      </p:cxnSp>
+      <p:cxnSp>
+        <p:nvCxnSpPr>
+          <p:cNvPr id="65" name="Straight Arrow Connector 64"/>
+          <p:cNvCxnSpPr/>
+          <p:nvPr/>
+        </p:nvCxnSpPr>
+        <p:spPr>
+          <a:xfrm>
+            <a:off x="2581275" y="2224087"/>
+            <a:ext cx="1292397" cy="0"/>
+          </a:xfrm>
+          <a:prstGeom prst="straightConnector1">
+            <a:avLst/>
+          </a:prstGeom>
+          <a:ln>
+            <a:solidFill>
+              <a:schemeClr val="tx1"/>
+            </a:solidFill>
+            <a:tailEnd type="triangle"/>
+          </a:ln>
+        </p:spPr>
+        <p:style>
+          <a:lnRef idx="1">
+            <a:schemeClr val="accent1"/>
+          </a:lnRef>
+          <a:fillRef idx="0">
+            <a:schemeClr val="accent1"/>
+          </a:fillRef>
+          <a:effectRef idx="0">
+            <a:schemeClr val="accent1"/>
+          </a:effectRef>
+          <a:fontRef idx="minor">
+            <a:schemeClr val="tx1"/>
+          </a:fontRef>
+        </p:style>
+      </p:cxnSp>
+      <p:cxnSp>
+        <p:nvCxnSpPr>
+          <p:cNvPr id="67" name="Straight Arrow Connector 66"/>
+          <p:cNvCxnSpPr/>
+          <p:nvPr/>
+        </p:nvCxnSpPr>
+        <p:spPr>
+          <a:xfrm>
+            <a:off x="1363588" y="1900922"/>
+            <a:ext cx="2510084" cy="0"/>
+          </a:xfrm>
+          <a:prstGeom prst="straightConnector1">
+            <a:avLst/>
+          </a:prstGeom>
+          <a:ln>
+            <a:solidFill>
+              <a:schemeClr val="tx1"/>
+            </a:solidFill>
+            <a:tailEnd type="triangle"/>
+          </a:ln>
+        </p:spPr>
+        <p:style>
+          <a:lnRef idx="1">
+            <a:schemeClr val="accent1"/>
+          </a:lnRef>
+          <a:fillRef idx="0">
+            <a:schemeClr val="accent1"/>
+          </a:fillRef>
+          <a:effectRef idx="0">
+            <a:schemeClr val="accent1"/>
+          </a:effectRef>
+          <a:fontRef idx="minor">
+            <a:schemeClr val="tx1"/>
+          </a:fontRef>
+        </p:style>
+      </p:cxnSp>
+      <p:cxnSp>
+        <p:nvCxnSpPr>
+          <p:cNvPr id="69" name="Straight Connector 68"/>
+          <p:cNvCxnSpPr>
+            <a:stCxn id="5" idx="3"/>
+          </p:cNvCxnSpPr>
+          <p:nvPr/>
+        </p:nvCxnSpPr>
+        <p:spPr>
+          <a:xfrm>
+            <a:off x="5302422" y="1954925"/>
+            <a:ext cx="94966" cy="0"/>
+          </a:xfrm>
+          <a:prstGeom prst="line">
+            <a:avLst/>
+          </a:prstGeom>
+          <a:ln>
+            <a:solidFill>
+              <a:schemeClr val="tx1"/>
+            </a:solidFill>
+          </a:ln>
+        </p:spPr>
+        <p:style>
+          <a:lnRef idx="1">
+            <a:schemeClr val="accent1"/>
+          </a:lnRef>
+          <a:fillRef idx="0">
+            <a:schemeClr val="accent1"/>
+          </a:fillRef>
+          <a:effectRef idx="0">
+            <a:schemeClr val="accent1"/>
+          </a:effectRef>
+          <a:fontRef idx="minor">
+            <a:schemeClr val="tx1"/>
+          </a:fontRef>
+        </p:style>
+      </p:cxnSp>
+      <p:cxnSp>
+        <p:nvCxnSpPr>
+          <p:cNvPr id="71" name="Straight Connector 70"/>
+          <p:cNvCxnSpPr/>
+          <p:nvPr/>
+        </p:nvCxnSpPr>
+        <p:spPr>
+          <a:xfrm>
+            <a:off x="5397388" y="1954925"/>
+            <a:ext cx="0" cy="1289981"/>
+          </a:xfrm>
+          <a:prstGeom prst="line">
+            <a:avLst/>
+          </a:prstGeom>
+          <a:ln>
+            <a:solidFill>
+              <a:schemeClr val="tx1"/>
+            </a:solidFill>
+          </a:ln>
+        </p:spPr>
+        <p:style>
+          <a:lnRef idx="1">
+            <a:schemeClr val="accent1"/>
+          </a:lnRef>
+          <a:fillRef idx="0">
+            <a:schemeClr val="accent1"/>
+          </a:fillRef>
+          <a:effectRef idx="0">
+            <a:schemeClr val="accent1"/>
+          </a:effectRef>
+          <a:fontRef idx="minor">
+            <a:schemeClr val="tx1"/>
+          </a:fontRef>
+        </p:style>
+      </p:cxnSp>
+      <p:cxnSp>
+        <p:nvCxnSpPr>
+          <p:cNvPr id="73" name="Straight Arrow Connector 72"/>
+          <p:cNvCxnSpPr/>
+          <p:nvPr/>
+        </p:nvCxnSpPr>
+        <p:spPr>
+          <a:xfrm>
+            <a:off x="5397388" y="3244906"/>
+            <a:ext cx="350949" cy="0"/>
+          </a:xfrm>
+          <a:prstGeom prst="straightConnector1">
+            <a:avLst/>
+          </a:prstGeom>
+          <a:ln>
+            <a:solidFill>
+              <a:schemeClr val="tx1"/>
+            </a:solidFill>
+            <a:tailEnd type="triangle"/>
+          </a:ln>
+        </p:spPr>
+        <p:style>
+          <a:lnRef idx="1">
+            <a:schemeClr val="accent1"/>
+          </a:lnRef>
+          <a:fillRef idx="0">
+            <a:schemeClr val="accent1"/>
+          </a:fillRef>
+          <a:effectRef idx="0">
+            <a:schemeClr val="accent1"/>
+          </a:effectRef>
+          <a:fontRef idx="minor">
+            <a:schemeClr val="tx1"/>
+          </a:fontRef>
+        </p:style>
+      </p:cxnSp>
+      <p:cxnSp>
+        <p:nvCxnSpPr>
+          <p:cNvPr id="75" name="Straight Connector 74"/>
+          <p:cNvCxnSpPr/>
+          <p:nvPr/>
+        </p:nvCxnSpPr>
+        <p:spPr>
+          <a:xfrm>
+            <a:off x="5397388" y="3244906"/>
+            <a:ext cx="0" cy="1385897"/>
+          </a:xfrm>
+          <a:prstGeom prst="line">
+            <a:avLst/>
+          </a:prstGeom>
+          <a:ln>
+            <a:solidFill>
+              <a:schemeClr val="tx1"/>
+            </a:solidFill>
+          </a:ln>
+        </p:spPr>
+        <p:style>
+          <a:lnRef idx="1">
+            <a:schemeClr val="accent1"/>
+          </a:lnRef>
+          <a:fillRef idx="0">
+            <a:schemeClr val="accent1"/>
+          </a:fillRef>
+          <a:effectRef idx="0">
+            <a:schemeClr val="accent1"/>
+          </a:effectRef>
+          <a:fontRef idx="minor">
+            <a:schemeClr val="tx1"/>
+          </a:fontRef>
+        </p:style>
+      </p:cxnSp>
+      <p:cxnSp>
+        <p:nvCxnSpPr>
+          <p:cNvPr id="77" name="Straight Arrow Connector 76"/>
+          <p:cNvCxnSpPr/>
+          <p:nvPr/>
+        </p:nvCxnSpPr>
+        <p:spPr>
+          <a:xfrm>
+            <a:off x="5397388" y="4630803"/>
+            <a:ext cx="369999" cy="0"/>
+          </a:xfrm>
+          <a:prstGeom prst="straightConnector1">
+            <a:avLst/>
+          </a:prstGeom>
+          <a:ln>
+            <a:solidFill>
+              <a:schemeClr val="tx1"/>
+            </a:solidFill>
+            <a:tailEnd type="triangle"/>
+          </a:ln>
+        </p:spPr>
+        <p:style>
+          <a:lnRef idx="1">
+            <a:schemeClr val="accent1"/>
+          </a:lnRef>
+          <a:fillRef idx="0">
+            <a:schemeClr val="accent1"/>
+          </a:fillRef>
+          <a:effectRef idx="0">
+            <a:schemeClr val="accent1"/>
+          </a:effectRef>
+          <a:fontRef idx="minor">
+            <a:schemeClr val="tx1"/>
+          </a:fontRef>
+        </p:style>
+      </p:cxnSp>
+      <p:cxnSp>
+        <p:nvCxnSpPr>
+          <p:cNvPr id="79" name="Straight Connector 78"/>
+          <p:cNvCxnSpPr>
+            <a:stCxn id="10" idx="3"/>
+          </p:cNvCxnSpPr>
+          <p:nvPr/>
+        </p:nvCxnSpPr>
+        <p:spPr>
+          <a:xfrm>
+            <a:off x="3295650" y="5236368"/>
+            <a:ext cx="578022" cy="0"/>
+          </a:xfrm>
+          <a:prstGeom prst="line">
+            <a:avLst/>
+          </a:prstGeom>
+          <a:ln>
+            <a:solidFill>
+              <a:schemeClr val="tx1"/>
+            </a:solidFill>
+          </a:ln>
+        </p:spPr>
+        <p:style>
+          <a:lnRef idx="1">
+            <a:schemeClr val="accent1"/>
+          </a:lnRef>
+          <a:fillRef idx="0">
+            <a:schemeClr val="accent1"/>
+          </a:fillRef>
+          <a:effectRef idx="0">
+            <a:schemeClr val="accent1"/>
+          </a:effectRef>
+          <a:fontRef idx="minor">
+            <a:schemeClr val="tx1"/>
+          </a:fontRef>
+        </p:style>
+      </p:cxnSp>
+      <p:cxnSp>
+        <p:nvCxnSpPr>
+          <p:cNvPr id="81" name="Straight Connector 80"/>
+          <p:cNvCxnSpPr/>
+          <p:nvPr/>
+        </p:nvCxnSpPr>
+        <p:spPr>
+          <a:xfrm flipV="1">
+            <a:off x="3873672" y="3762796"/>
+            <a:ext cx="0" cy="1473573"/>
+          </a:xfrm>
+          <a:prstGeom prst="line">
+            <a:avLst/>
+          </a:prstGeom>
+          <a:ln>
+            <a:solidFill>
+              <a:schemeClr val="tx1"/>
+            </a:solidFill>
+          </a:ln>
+        </p:spPr>
+        <p:style>
+          <a:lnRef idx="1">
+            <a:schemeClr val="accent1"/>
+          </a:lnRef>
+          <a:fillRef idx="0">
+            <a:schemeClr val="accent1"/>
+          </a:fillRef>
+          <a:effectRef idx="0">
+            <a:schemeClr val="accent1"/>
+          </a:effectRef>
+          <a:fontRef idx="minor">
+            <a:schemeClr val="tx1"/>
+          </a:fontRef>
+        </p:style>
+      </p:cxnSp>
+      <p:cxnSp>
+        <p:nvCxnSpPr>
+          <p:cNvPr id="83" name="Straight Arrow Connector 82"/>
+          <p:cNvCxnSpPr/>
+          <p:nvPr/>
+        </p:nvCxnSpPr>
+        <p:spPr>
+          <a:xfrm flipV="1">
+            <a:off x="3881685" y="3762797"/>
+            <a:ext cx="1866652" cy="4744"/>
+          </a:xfrm>
+          <a:prstGeom prst="straightConnector1">
+            <a:avLst/>
+          </a:prstGeom>
+          <a:ln>
+            <a:solidFill>
+              <a:schemeClr val="tx1"/>
+            </a:solidFill>
+            <a:tailEnd type="triangle"/>
+          </a:ln>
+        </p:spPr>
+        <p:style>
+          <a:lnRef idx="1">
+            <a:schemeClr val="accent1"/>
+          </a:lnRef>
+          <a:fillRef idx="0">
+            <a:schemeClr val="accent1"/>
+          </a:fillRef>
+          <a:effectRef idx="0">
+            <a:schemeClr val="accent1"/>
+          </a:effectRef>
+          <a:fontRef idx="minor">
+            <a:schemeClr val="tx1"/>
+          </a:fontRef>
+        </p:style>
+      </p:cxnSp>
+      <p:cxnSp>
+        <p:nvCxnSpPr>
+          <p:cNvPr id="87" name="Straight Arrow Connector 86"/>
+          <p:cNvCxnSpPr/>
+          <p:nvPr/>
+        </p:nvCxnSpPr>
+        <p:spPr>
+          <a:xfrm>
+            <a:off x="3881685" y="5061063"/>
+            <a:ext cx="1885702" cy="12644"/>
+          </a:xfrm>
+          <a:prstGeom prst="straightConnector1">
+            <a:avLst/>
+          </a:prstGeom>
+          <a:ln>
+            <a:solidFill>
+              <a:schemeClr val="tx1"/>
+            </a:solidFill>
+            <a:tailEnd type="triangle"/>
+          </a:ln>
+        </p:spPr>
+        <p:style>
+          <a:lnRef idx="1">
+            <a:schemeClr val="accent1"/>
+          </a:lnRef>
+          <a:fillRef idx="0">
+            <a:schemeClr val="accent1"/>
+          </a:fillRef>
+          <a:effectRef idx="0">
+            <a:schemeClr val="accent1"/>
+          </a:effectRef>
+          <a:fontRef idx="minor">
+            <a:schemeClr val="tx1"/>
+          </a:fontRef>
+        </p:style>
+      </p:cxnSp>
+      <p:cxnSp>
+        <p:nvCxnSpPr>
+          <p:cNvPr id="93" name="Straight Arrow Connector 92"/>
+          <p:cNvCxnSpPr/>
+          <p:nvPr/>
+        </p:nvCxnSpPr>
+        <p:spPr>
+          <a:xfrm>
+            <a:off x="7177087" y="4848777"/>
+            <a:ext cx="4251436" cy="13977"/>
+          </a:xfrm>
+          <a:prstGeom prst="straightConnector1">
+            <a:avLst/>
+          </a:prstGeom>
+          <a:ln>
+            <a:solidFill>
+              <a:schemeClr val="tx1"/>
+            </a:solidFill>
+            <a:tailEnd type="triangle"/>
+          </a:ln>
+        </p:spPr>
+        <p:style>
+          <a:lnRef idx="1">
+            <a:schemeClr val="accent1"/>
+          </a:lnRef>
+          <a:fillRef idx="0">
+            <a:schemeClr val="accent1"/>
+          </a:fillRef>
+          <a:effectRef idx="0">
+            <a:schemeClr val="accent1"/>
+          </a:effectRef>
+          <a:fontRef idx="minor">
+            <a:schemeClr val="tx1"/>
+          </a:fontRef>
+        </p:style>
+      </p:cxnSp>
+      <p:cxnSp>
+        <p:nvCxnSpPr>
+          <p:cNvPr id="100" name="Straight Arrow Connector 99"/>
+          <p:cNvCxnSpPr>
+            <a:endCxn id="12" idx="1"/>
+          </p:cNvCxnSpPr>
+          <p:nvPr/>
+        </p:nvCxnSpPr>
+        <p:spPr>
+          <a:xfrm>
+            <a:off x="7177087" y="3454185"/>
+            <a:ext cx="656166" cy="272"/>
+          </a:xfrm>
+          <a:prstGeom prst="straightConnector1">
+            <a:avLst/>
+          </a:prstGeom>
+          <a:ln>
+            <a:solidFill>
+              <a:schemeClr val="tx1"/>
+            </a:solidFill>
+            <a:tailEnd type="triangle"/>
+          </a:ln>
+        </p:spPr>
+        <p:style>
+          <a:lnRef idx="1">
+            <a:schemeClr val="accent1"/>
+          </a:lnRef>
+          <a:fillRef idx="0">
+            <a:schemeClr val="accent1"/>
+          </a:fillRef>
+          <a:effectRef idx="0">
+            <a:schemeClr val="accent1"/>
+          </a:effectRef>
+          <a:fontRef idx="minor">
+            <a:schemeClr val="tx1"/>
+          </a:fontRef>
+        </p:style>
+      </p:cxnSp>
+      <p:cxnSp>
+        <p:nvCxnSpPr>
+          <p:cNvPr id="104" name="Straight Connector 103"/>
+          <p:cNvCxnSpPr/>
+          <p:nvPr/>
+        </p:nvCxnSpPr>
+        <p:spPr>
+          <a:xfrm flipV="1">
+            <a:off x="7436581" y="2843212"/>
+            <a:ext cx="0" cy="611245"/>
+          </a:xfrm>
+          <a:prstGeom prst="line">
+            <a:avLst/>
+          </a:prstGeom>
+          <a:ln>
+            <a:solidFill>
+              <a:schemeClr val="tx1"/>
+            </a:solidFill>
+          </a:ln>
+        </p:spPr>
+        <p:style>
+          <a:lnRef idx="1">
+            <a:schemeClr val="accent1"/>
+          </a:lnRef>
+          <a:fillRef idx="0">
+            <a:schemeClr val="accent1"/>
+          </a:fillRef>
+          <a:effectRef idx="0">
+            <a:schemeClr val="accent1"/>
+          </a:effectRef>
+          <a:fontRef idx="minor">
+            <a:schemeClr val="tx1"/>
+          </a:fontRef>
+        </p:style>
+      </p:cxnSp>
+      <p:cxnSp>
+        <p:nvCxnSpPr>
+          <p:cNvPr id="106" name="Straight Arrow Connector 105"/>
+          <p:cNvCxnSpPr/>
+          <p:nvPr/>
+        </p:nvCxnSpPr>
+        <p:spPr>
+          <a:xfrm>
+            <a:off x="7436581" y="2841526"/>
+            <a:ext cx="396672" cy="1686"/>
+          </a:xfrm>
+          <a:prstGeom prst="straightConnector1">
+            <a:avLst/>
+          </a:prstGeom>
+          <a:ln>
+            <a:solidFill>
+              <a:schemeClr val="tx1"/>
+            </a:solidFill>
+            <a:tailEnd type="triangle"/>
+          </a:ln>
+        </p:spPr>
+        <p:style>
+          <a:lnRef idx="1">
+            <a:schemeClr val="accent1"/>
+          </a:lnRef>
+          <a:fillRef idx="0">
+            <a:schemeClr val="accent1"/>
+          </a:fillRef>
+          <a:effectRef idx="0">
+            <a:schemeClr val="accent1"/>
+          </a:effectRef>
+          <a:fontRef idx="minor">
+            <a:schemeClr val="tx1"/>
+          </a:fontRef>
+        </p:style>
+      </p:cxnSp>
+      <p:cxnSp>
+        <p:nvCxnSpPr>
+          <p:cNvPr id="108" name="Straight Connector 107"/>
+          <p:cNvCxnSpPr/>
+          <p:nvPr/>
+        </p:nvCxnSpPr>
+        <p:spPr>
+          <a:xfrm>
+            <a:off x="7436581" y="3454457"/>
+            <a:ext cx="0" cy="628653"/>
+          </a:xfrm>
+          <a:prstGeom prst="line">
+            <a:avLst/>
+          </a:prstGeom>
+          <a:ln>
+            <a:solidFill>
+              <a:schemeClr val="tx1"/>
+            </a:solidFill>
+          </a:ln>
+        </p:spPr>
+        <p:style>
+          <a:lnRef idx="1">
+            <a:schemeClr val="accent1"/>
+          </a:lnRef>
+          <a:fillRef idx="0">
+            <a:schemeClr val="accent1"/>
+          </a:fillRef>
+          <a:effectRef idx="0">
+            <a:schemeClr val="accent1"/>
+          </a:effectRef>
+          <a:fontRef idx="minor">
+            <a:schemeClr val="tx1"/>
+          </a:fontRef>
+        </p:style>
+      </p:cxnSp>
+      <p:cxnSp>
+        <p:nvCxnSpPr>
+          <p:cNvPr id="110" name="Straight Arrow Connector 109"/>
+          <p:cNvCxnSpPr>
+            <a:endCxn id="13" idx="1"/>
+          </p:cNvCxnSpPr>
+          <p:nvPr/>
+        </p:nvCxnSpPr>
+        <p:spPr>
+          <a:xfrm>
+            <a:off x="7436581" y="4083110"/>
+            <a:ext cx="396672" cy="0"/>
+          </a:xfrm>
+          <a:prstGeom prst="straightConnector1">
+            <a:avLst/>
+          </a:prstGeom>
+          <a:ln>
+            <a:solidFill>
+              <a:schemeClr val="tx1"/>
+            </a:solidFill>
+            <a:tailEnd type="triangle"/>
+          </a:ln>
+        </p:spPr>
+        <p:style>
+          <a:lnRef idx="1">
+            <a:schemeClr val="accent1"/>
+          </a:lnRef>
+          <a:fillRef idx="0">
+            <a:schemeClr val="accent1"/>
+          </a:fillRef>
+          <a:effectRef idx="0">
+            <a:schemeClr val="accent1"/>
+          </a:effectRef>
+          <a:fontRef idx="minor">
+            <a:schemeClr val="tx1"/>
+          </a:fontRef>
+        </p:style>
+      </p:cxnSp>
+      <p:cxnSp>
+        <p:nvCxnSpPr>
+          <p:cNvPr id="129" name="Straight Connector 128"/>
+          <p:cNvCxnSpPr/>
+          <p:nvPr/>
+        </p:nvCxnSpPr>
+        <p:spPr>
+          <a:xfrm>
+            <a:off x="8860440" y="2825532"/>
+            <a:ext cx="376255" cy="0"/>
+          </a:xfrm>
+          <a:prstGeom prst="line">
+            <a:avLst/>
+          </a:prstGeom>
+          <a:ln>
+            <a:solidFill>
+              <a:schemeClr val="tx1"/>
+            </a:solidFill>
+          </a:ln>
+        </p:spPr>
+        <p:style>
+          <a:lnRef idx="1">
+            <a:schemeClr val="accent1"/>
+          </a:lnRef>
+          <a:fillRef idx="0">
+            <a:schemeClr val="accent1"/>
+          </a:fillRef>
+          <a:effectRef idx="0">
+            <a:schemeClr val="accent1"/>
+          </a:effectRef>
+          <a:fontRef idx="minor">
+            <a:schemeClr val="tx1"/>
+          </a:fontRef>
+        </p:style>
+      </p:cxnSp>
+      <p:cxnSp>
+        <p:nvCxnSpPr>
+          <p:cNvPr id="131" name="Straight Connector 130"/>
+          <p:cNvCxnSpPr/>
+          <p:nvPr/>
+        </p:nvCxnSpPr>
+        <p:spPr>
+          <a:xfrm>
+            <a:off x="9236695" y="2825532"/>
+            <a:ext cx="0" cy="419374"/>
+          </a:xfrm>
+          <a:prstGeom prst="line">
+            <a:avLst/>
+          </a:prstGeom>
+          <a:ln>
+            <a:solidFill>
+              <a:schemeClr val="tx1"/>
+            </a:solidFill>
+          </a:ln>
+        </p:spPr>
+        <p:style>
+          <a:lnRef idx="1">
+            <a:schemeClr val="accent1"/>
+          </a:lnRef>
+          <a:fillRef idx="0">
+            <a:schemeClr val="accent1"/>
+          </a:fillRef>
+          <a:effectRef idx="0">
+            <a:schemeClr val="accent1"/>
+          </a:effectRef>
+          <a:fontRef idx="minor">
+            <a:schemeClr val="tx1"/>
+          </a:fontRef>
+        </p:style>
+      </p:cxnSp>
+      <p:cxnSp>
+        <p:nvCxnSpPr>
+          <p:cNvPr id="133" name="Straight Arrow Connector 132"/>
+          <p:cNvCxnSpPr/>
+          <p:nvPr/>
+        </p:nvCxnSpPr>
+        <p:spPr>
+          <a:xfrm>
+            <a:off x="9236695" y="3244906"/>
+            <a:ext cx="1821830" cy="0"/>
+          </a:xfrm>
+          <a:prstGeom prst="straightConnector1">
+            <a:avLst/>
+          </a:prstGeom>
+          <a:ln>
+            <a:solidFill>
+              <a:schemeClr val="tx1"/>
+            </a:solidFill>
+            <a:tailEnd type="triangle"/>
+          </a:ln>
+        </p:spPr>
+        <p:style>
+          <a:lnRef idx="1">
+            <a:schemeClr val="accent1"/>
+          </a:lnRef>
+          <a:fillRef idx="0">
+            <a:schemeClr val="accent1"/>
+          </a:fillRef>
+          <a:effectRef idx="0">
+            <a:schemeClr val="accent1"/>
+          </a:effectRef>
+          <a:fontRef idx="minor">
+            <a:schemeClr val="tx1"/>
+          </a:fontRef>
+        </p:style>
+      </p:cxnSp>
+      <p:cxnSp>
+        <p:nvCxnSpPr>
+          <p:cNvPr id="136" name="Straight Connector 135"/>
+          <p:cNvCxnSpPr/>
+          <p:nvPr/>
+        </p:nvCxnSpPr>
+        <p:spPr>
+          <a:xfrm>
+            <a:off x="8860440" y="4083110"/>
+            <a:ext cx="376255" cy="0"/>
+          </a:xfrm>
+          <a:prstGeom prst="line">
+            <a:avLst/>
+          </a:prstGeom>
+          <a:ln>
+            <a:solidFill>
+              <a:schemeClr val="tx1"/>
+            </a:solidFill>
+          </a:ln>
+        </p:spPr>
+        <p:style>
+          <a:lnRef idx="1">
+            <a:schemeClr val="accent1"/>
+          </a:lnRef>
+          <a:fillRef idx="0">
+            <a:schemeClr val="accent1"/>
+          </a:fillRef>
+          <a:effectRef idx="0">
+            <a:schemeClr val="accent1"/>
+          </a:effectRef>
+          <a:fontRef idx="minor">
+            <a:schemeClr val="tx1"/>
+          </a:fontRef>
+        </p:style>
+      </p:cxnSp>
+      <p:cxnSp>
+        <p:nvCxnSpPr>
+          <p:cNvPr id="138" name="Straight Connector 137"/>
+          <p:cNvCxnSpPr/>
+          <p:nvPr/>
+        </p:nvCxnSpPr>
+        <p:spPr>
+          <a:xfrm flipV="1">
+            <a:off x="9236695" y="3702073"/>
+            <a:ext cx="0" cy="381037"/>
+          </a:xfrm>
+          <a:prstGeom prst="line">
+            <a:avLst/>
+          </a:prstGeom>
+          <a:ln>
+            <a:solidFill>
+              <a:schemeClr val="tx1"/>
+            </a:solidFill>
+          </a:ln>
+        </p:spPr>
+        <p:style>
+          <a:lnRef idx="1">
+            <a:schemeClr val="accent1"/>
+          </a:lnRef>
+          <a:fillRef idx="0">
+            <a:schemeClr val="accent1"/>
+          </a:fillRef>
+          <a:effectRef idx="0">
+            <a:schemeClr val="accent1"/>
+          </a:effectRef>
+          <a:fontRef idx="minor">
+            <a:schemeClr val="tx1"/>
+          </a:fontRef>
+        </p:style>
+      </p:cxnSp>
+      <p:cxnSp>
+        <p:nvCxnSpPr>
+          <p:cNvPr id="140" name="Straight Arrow Connector 139"/>
+          <p:cNvCxnSpPr/>
+          <p:nvPr/>
+        </p:nvCxnSpPr>
+        <p:spPr>
+          <a:xfrm>
+            <a:off x="9236695" y="3702073"/>
+            <a:ext cx="1821830" cy="0"/>
+          </a:xfrm>
+          <a:prstGeom prst="straightConnector1">
+            <a:avLst/>
+          </a:prstGeom>
+          <a:ln>
+            <a:solidFill>
+              <a:schemeClr val="tx1"/>
+            </a:solidFill>
+            <a:tailEnd type="triangle"/>
+          </a:ln>
+        </p:spPr>
+        <p:style>
+          <a:lnRef idx="1">
+            <a:schemeClr val="accent1"/>
+          </a:lnRef>
+          <a:fillRef idx="0">
+            <a:schemeClr val="accent1"/>
+          </a:fillRef>
+          <a:effectRef idx="0">
+            <a:schemeClr val="accent1"/>
+          </a:effectRef>
+          <a:fontRef idx="minor">
+            <a:schemeClr val="tx1"/>
+          </a:fontRef>
+        </p:style>
+      </p:cxnSp>
+      <p:cxnSp>
+        <p:nvCxnSpPr>
+          <p:cNvPr id="142" name="Straight Arrow Connector 141"/>
+          <p:cNvCxnSpPr>
+            <a:stCxn id="12" idx="3"/>
+          </p:cNvCxnSpPr>
+          <p:nvPr/>
+        </p:nvCxnSpPr>
+        <p:spPr>
+          <a:xfrm>
+            <a:off x="8852428" y="3454457"/>
+            <a:ext cx="2602768" cy="25286"/>
+          </a:xfrm>
+          <a:prstGeom prst="straightConnector1">
+            <a:avLst/>
+          </a:prstGeom>
+          <a:ln>
+            <a:solidFill>
+              <a:schemeClr val="tx1"/>
+            </a:solidFill>
+            <a:tailEnd type="triangle"/>
+          </a:ln>
+        </p:spPr>
+        <p:style>
+          <a:lnRef idx="1">
+            <a:schemeClr val="accent1"/>
+          </a:lnRef>
+          <a:fillRef idx="0">
+            <a:schemeClr val="accent1"/>
+          </a:fillRef>
+          <a:effectRef idx="0">
+            <a:schemeClr val="accent1"/>
+          </a:effectRef>
+          <a:fontRef idx="minor">
+            <a:schemeClr val="tx1"/>
+          </a:fontRef>
+        </p:style>
+      </p:cxnSp>
+      <p:sp>
+        <p:nvSpPr>
+          <p:cNvPr id="148" name="TextBox 147"/>
+          <p:cNvSpPr txBox="1"/>
+          <p:nvPr/>
+        </p:nvSpPr>
+        <p:spPr>
+          <a:xfrm>
+            <a:off x="11132434" y="2841526"/>
+            <a:ext cx="957121" cy="646331"/>
+          </a:xfrm>
+          <a:prstGeom prst="rect">
+            <a:avLst/>
+          </a:prstGeom>
+          <a:noFill/>
+        </p:spPr>
+        <p:txBody>
+          <a:bodyPr wrap="none" rtlCol="0">
+            <a:spAutoFit/>
+          </a:bodyPr>
+          <a:lstStyle/>
+          <a:p>
+            <a:r>
+              <a:rPr lang="en-US" dirty="0" smtClean="0"/>
+              <a:t>Leveled </a:t>
+            </a:r>
+            <a:br>
+              <a:rPr lang="en-US" dirty="0" smtClean="0"/>
+            </a:br>
+            <a:r>
+              <a:rPr lang="en-US" dirty="0" smtClean="0"/>
+              <a:t>Table</a:t>
+            </a:r>
+            <a:endParaRPr lang="en-US" dirty="0"/>
+          </a:p>
+        </p:txBody>
+      </p:sp>
+      <p:sp>
+        <p:nvSpPr>
+          <p:cNvPr id="151" name="TextBox 150"/>
+          <p:cNvSpPr txBox="1"/>
+          <p:nvPr/>
+        </p:nvSpPr>
+        <p:spPr>
+          <a:xfrm>
+            <a:off x="11132434" y="5057522"/>
+            <a:ext cx="1089465" cy="1200329"/>
+          </a:xfrm>
+          <a:prstGeom prst="rect">
+            <a:avLst/>
+          </a:prstGeom>
+          <a:noFill/>
+        </p:spPr>
+        <p:txBody>
+          <a:bodyPr wrap="none" rtlCol="0">
+            <a:spAutoFit/>
+          </a:bodyPr>
+          <a:lstStyle/>
+          <a:p>
+            <a:r>
+              <a:rPr lang="en-US" dirty="0" smtClean="0"/>
+              <a:t>LCD base </a:t>
+            </a:r>
+            <a:br>
+              <a:rPr lang="en-US" dirty="0" smtClean="0"/>
+            </a:br>
+            <a:r>
+              <a:rPr lang="en-US" dirty="0" smtClean="0"/>
+              <a:t>angle </a:t>
+            </a:r>
+            <a:br>
+              <a:rPr lang="en-US" dirty="0" smtClean="0"/>
+            </a:br>
+            <a:r>
+              <a:rPr lang="en-US" dirty="0" smtClean="0"/>
+              <a:t>display </a:t>
+            </a:r>
+            <a:br>
+              <a:rPr lang="en-US" dirty="0" smtClean="0"/>
+            </a:br>
+            <a:r>
+              <a:rPr lang="en-US" dirty="0" smtClean="0"/>
+              <a:t>info</a:t>
+            </a:r>
+            <a:endParaRPr lang="en-US" dirty="0"/>
           </a:p>
         </p:txBody>
       </p:sp>
@@ -3747,6 +5167,13 @@
   <p:clrMapOvr>
     <a:masterClrMapping/>
   </p:clrMapOvr>
+  <p:timing>
+    <p:tnLst>
+      <p:par>
+        <p:cTn id="1" dur="indefinite" restart="never" nodeType="tmRoot"/>
+      </p:par>
+    </p:tnLst>
+  </p:timing>
 </p:sld>
 </file>
 

</xml_diff>

<commit_message>
Acrylic after laser cut
Adding the pictures of the acrylic I took on my phone on Wednesday.
</commit_message>
<xml_diff>
--- a/Block Diagram/HW5_BlockDiagrams.pptx
+++ b/Block Diagram/HW5_BlockDiagrams.pptx
@@ -105,6 +105,11 @@
       </a:defRPr>
     </a:lvl9pPr>
   </p:defaultTextStyle>
+  <p:extLst>
+    <p:ext uri="{EFAFB233-063F-42B5-8137-9DF3F51BA10A}">
+      <p15:sldGuideLst xmlns:p15="http://schemas.microsoft.com/office/powerpoint/2012/main"/>
+    </p:ext>
+  </p:extLst>
 </p:presentation>
 </file>
 
@@ -239,7 +244,7 @@
           <a:p>
             <a:fld id="{00E37F5A-95EC-4F7A-9848-EEB36B306290}" type="datetimeFigureOut">
               <a:rPr lang="en-US" smtClean="0"/>
-              <a:t>11/8/2015</a:t>
+              <a:t>11/14/2015</a:t>
             </a:fld>
             <a:endParaRPr lang="en-US"/>
           </a:p>
@@ -409,7 +414,7 @@
           <a:p>
             <a:fld id="{00E37F5A-95EC-4F7A-9848-EEB36B306290}" type="datetimeFigureOut">
               <a:rPr lang="en-US" smtClean="0"/>
-              <a:t>11/8/2015</a:t>
+              <a:t>11/14/2015</a:t>
             </a:fld>
             <a:endParaRPr lang="en-US"/>
           </a:p>
@@ -589,7 +594,7 @@
           <a:p>
             <a:fld id="{00E37F5A-95EC-4F7A-9848-EEB36B306290}" type="datetimeFigureOut">
               <a:rPr lang="en-US" smtClean="0"/>
-              <a:t>11/8/2015</a:t>
+              <a:t>11/14/2015</a:t>
             </a:fld>
             <a:endParaRPr lang="en-US"/>
           </a:p>
@@ -759,7 +764,7 @@
           <a:p>
             <a:fld id="{00E37F5A-95EC-4F7A-9848-EEB36B306290}" type="datetimeFigureOut">
               <a:rPr lang="en-US" smtClean="0"/>
-              <a:t>11/8/2015</a:t>
+              <a:t>11/14/2015</a:t>
             </a:fld>
             <a:endParaRPr lang="en-US"/>
           </a:p>
@@ -1005,7 +1010,7 @@
           <a:p>
             <a:fld id="{00E37F5A-95EC-4F7A-9848-EEB36B306290}" type="datetimeFigureOut">
               <a:rPr lang="en-US" smtClean="0"/>
-              <a:t>11/8/2015</a:t>
+              <a:t>11/14/2015</a:t>
             </a:fld>
             <a:endParaRPr lang="en-US"/>
           </a:p>
@@ -1237,7 +1242,7 @@
           <a:p>
             <a:fld id="{00E37F5A-95EC-4F7A-9848-EEB36B306290}" type="datetimeFigureOut">
               <a:rPr lang="en-US" smtClean="0"/>
-              <a:t>11/8/2015</a:t>
+              <a:t>11/14/2015</a:t>
             </a:fld>
             <a:endParaRPr lang="en-US"/>
           </a:p>
@@ -1604,7 +1609,7 @@
           <a:p>
             <a:fld id="{00E37F5A-95EC-4F7A-9848-EEB36B306290}" type="datetimeFigureOut">
               <a:rPr lang="en-US" smtClean="0"/>
-              <a:t>11/8/2015</a:t>
+              <a:t>11/14/2015</a:t>
             </a:fld>
             <a:endParaRPr lang="en-US"/>
           </a:p>
@@ -1722,7 +1727,7 @@
           <a:p>
             <a:fld id="{00E37F5A-95EC-4F7A-9848-EEB36B306290}" type="datetimeFigureOut">
               <a:rPr lang="en-US" smtClean="0"/>
-              <a:t>11/8/2015</a:t>
+              <a:t>11/14/2015</a:t>
             </a:fld>
             <a:endParaRPr lang="en-US"/>
           </a:p>
@@ -1817,7 +1822,7 @@
           <a:p>
             <a:fld id="{00E37F5A-95EC-4F7A-9848-EEB36B306290}" type="datetimeFigureOut">
               <a:rPr lang="en-US" smtClean="0"/>
-              <a:t>11/8/2015</a:t>
+              <a:t>11/14/2015</a:t>
             </a:fld>
             <a:endParaRPr lang="en-US"/>
           </a:p>
@@ -2094,7 +2099,7 @@
           <a:p>
             <a:fld id="{00E37F5A-95EC-4F7A-9848-EEB36B306290}" type="datetimeFigureOut">
               <a:rPr lang="en-US" smtClean="0"/>
-              <a:t>11/8/2015</a:t>
+              <a:t>11/14/2015</a:t>
             </a:fld>
             <a:endParaRPr lang="en-US"/>
           </a:p>
@@ -2347,7 +2352,7 @@
           <a:p>
             <a:fld id="{00E37F5A-95EC-4F7A-9848-EEB36B306290}" type="datetimeFigureOut">
               <a:rPr lang="en-US" smtClean="0"/>
-              <a:t>11/8/2015</a:t>
+              <a:t>11/14/2015</a:t>
             </a:fld>
             <a:endParaRPr lang="en-US"/>
           </a:p>
@@ -2560,7 +2565,7 @@
           <a:p>
             <a:fld id="{00E37F5A-95EC-4F7A-9848-EEB36B306290}" type="datetimeFigureOut">
               <a:rPr lang="en-US" smtClean="0"/>
-              <a:t>11/8/2015</a:t>
+              <a:t>11/14/2015</a:t>
             </a:fld>
             <a:endParaRPr lang="en-US"/>
           </a:p>
@@ -3190,14 +3195,12 @@
       <p:cxnSp>
         <p:nvCxnSpPr>
           <p:cNvPr id="12" name="Straight Arrow Connector 11"/>
-          <p:cNvCxnSpPr>
-            <a:stCxn id="5" idx="3"/>
-          </p:cNvCxnSpPr>
+          <p:cNvCxnSpPr/>
           <p:nvPr/>
         </p:nvCxnSpPr>
         <p:spPr>
           <a:xfrm>
-            <a:off x="7791450" y="3190875"/>
+            <a:off x="7791450" y="3094320"/>
             <a:ext cx="923925" cy="0"/>
           </a:xfrm>
           <a:prstGeom prst="straightConnector1">
@@ -3231,7 +3234,7 @@
         </p:nvSpPr>
         <p:spPr>
           <a:xfrm>
-            <a:off x="8667750" y="2867709"/>
+            <a:off x="8715375" y="2771154"/>
             <a:ext cx="1120756" cy="646331"/>
           </a:xfrm>
           <a:prstGeom prst="rect">
@@ -3300,7 +3303,7 @@
         <p:spPr>
           <a:xfrm>
             <a:off x="1371600" y="942974"/>
-            <a:ext cx="9686925" cy="5038726"/>
+            <a:ext cx="9686925" cy="4497706"/>
           </a:xfrm>
           <a:prstGeom prst="rect">
             <a:avLst/>
@@ -3347,12 +3350,20 @@
         </p:nvSpPr>
         <p:spPr>
           <a:xfrm>
-            <a:off x="1866900" y="1404937"/>
+            <a:off x="1931790" y="1376164"/>
             <a:ext cx="1428750" cy="1028700"/>
           </a:xfrm>
           <a:prstGeom prst="rect">
             <a:avLst/>
           </a:prstGeom>
+          <a:solidFill>
+            <a:schemeClr val="bg1"/>
+          </a:solidFill>
+          <a:ln>
+            <a:solidFill>
+              <a:schemeClr val="tx1"/>
+            </a:solidFill>
+          </a:ln>
         </p:spPr>
         <p:style>
           <a:lnRef idx="2">
@@ -3376,10 +3387,18 @@
           <a:p>
             <a:pPr algn="ctr"/>
             <a:r>
-              <a:rPr lang="en-US" sz="1600" dirty="0" smtClean="0"/>
+              <a:rPr lang="en-US" sz="1600" dirty="0" smtClean="0">
+                <a:solidFill>
+                  <a:schemeClr val="tx1"/>
+                </a:solidFill>
+              </a:rPr>
               <a:t>Position Calculation</a:t>
             </a:r>
-            <a:endParaRPr lang="en-US" sz="1600" dirty="0"/>
+            <a:endParaRPr lang="en-US" sz="1600" dirty="0">
+              <a:solidFill>
+                <a:schemeClr val="tx1"/>
+              </a:solidFill>
+            </a:endParaRPr>
           </a:p>
         </p:txBody>
       </p:sp>
@@ -3391,12 +3410,20 @@
         </p:nvSpPr>
         <p:spPr>
           <a:xfrm>
-            <a:off x="6462712" y="1419223"/>
+            <a:off x="6537325" y="1371463"/>
             <a:ext cx="1428750" cy="1028700"/>
           </a:xfrm>
           <a:prstGeom prst="rect">
             <a:avLst/>
           </a:prstGeom>
+          <a:solidFill>
+            <a:schemeClr val="bg1"/>
+          </a:solidFill>
+          <a:ln>
+            <a:solidFill>
+              <a:schemeClr val="tx1"/>
+            </a:solidFill>
+          </a:ln>
         </p:spPr>
         <p:style>
           <a:lnRef idx="2">
@@ -3420,10 +3447,18 @@
           <a:p>
             <a:pPr algn="ctr"/>
             <a:r>
-              <a:rPr lang="en-US" sz="1600" dirty="0" smtClean="0"/>
+              <a:rPr lang="en-US" sz="1600" dirty="0" smtClean="0">
+                <a:solidFill>
+                  <a:schemeClr val="tx1"/>
+                </a:solidFill>
+              </a:rPr>
               <a:t>Servo Controller</a:t>
             </a:r>
-            <a:endParaRPr lang="en-US" sz="1600" dirty="0"/>
+            <a:endParaRPr lang="en-US" sz="1600" dirty="0">
+              <a:solidFill>
+                <a:schemeClr val="tx1"/>
+              </a:solidFill>
+            </a:endParaRPr>
           </a:p>
         </p:txBody>
       </p:sp>
@@ -3435,12 +3470,20 @@
         </p:nvSpPr>
         <p:spPr>
           <a:xfrm>
-            <a:off x="2016125" y="3729038"/>
+            <a:off x="2010603" y="3857349"/>
             <a:ext cx="1428750" cy="1028700"/>
           </a:xfrm>
           <a:prstGeom prst="rect">
             <a:avLst/>
           </a:prstGeom>
+          <a:solidFill>
+            <a:schemeClr val="bg1"/>
+          </a:solidFill>
+          <a:ln>
+            <a:solidFill>
+              <a:schemeClr val="tx1"/>
+            </a:solidFill>
+          </a:ln>
         </p:spPr>
         <p:style>
           <a:lnRef idx="2">
@@ -3464,17 +3507,29 @@
           <a:p>
             <a:pPr algn="ctr"/>
             <a:r>
-              <a:rPr lang="en-US" sz="1600" dirty="0" smtClean="0"/>
-              <a:t>Voltage Regulator </a:t>
+              <a:rPr lang="en-US" sz="1600" dirty="0" smtClean="0">
+                <a:solidFill>
+                  <a:schemeClr val="tx1"/>
+                </a:solidFill>
+              </a:rPr>
+              <a:t>Power</a:t>
             </a:r>
           </a:p>
           <a:p>
             <a:pPr algn="ctr"/>
             <a:r>
-              <a:rPr lang="en-US" sz="1600" dirty="0" smtClean="0"/>
-              <a:t>6V to 3.3V</a:t>
-            </a:r>
-            <a:endParaRPr lang="en-US" sz="1600" dirty="0"/>
+              <a:rPr lang="en-US" sz="1600" dirty="0" smtClean="0">
+                <a:solidFill>
+                  <a:schemeClr val="tx1"/>
+                </a:solidFill>
+              </a:rPr>
+              <a:t>Regulator</a:t>
+            </a:r>
+            <a:endParaRPr lang="en-US" sz="1600" dirty="0">
+              <a:solidFill>
+                <a:schemeClr val="tx1"/>
+              </a:solidFill>
+            </a:endParaRPr>
           </a:p>
         </p:txBody>
       </p:sp>
@@ -3486,12 +3541,20 @@
         </p:nvSpPr>
         <p:spPr>
           <a:xfrm>
-            <a:off x="9153525" y="4243388"/>
+            <a:off x="9153522" y="3857349"/>
             <a:ext cx="1409700" cy="1028700"/>
           </a:xfrm>
           <a:prstGeom prst="rect">
             <a:avLst/>
           </a:prstGeom>
+          <a:solidFill>
+            <a:schemeClr val="bg1"/>
+          </a:solidFill>
+          <a:ln>
+            <a:solidFill>
+              <a:schemeClr val="tx1"/>
+            </a:solidFill>
+          </a:ln>
         </p:spPr>
         <p:style>
           <a:lnRef idx="2">
@@ -3515,10 +3578,18 @@
           <a:p>
             <a:pPr algn="ctr"/>
             <a:r>
-              <a:rPr lang="en-US" sz="1600" dirty="0" smtClean="0"/>
+              <a:rPr lang="en-US" sz="1600" dirty="0" smtClean="0">
+                <a:solidFill>
+                  <a:schemeClr val="tx1"/>
+                </a:solidFill>
+              </a:rPr>
               <a:t>LED Strip</a:t>
             </a:r>
-            <a:endParaRPr lang="en-US" sz="1600" dirty="0"/>
+            <a:endParaRPr lang="en-US" sz="1600" dirty="0">
+              <a:solidFill>
+                <a:schemeClr val="tx1"/>
+              </a:solidFill>
+            </a:endParaRPr>
           </a:p>
         </p:txBody>
       </p:sp>
@@ -3536,6 +3607,14 @@
           <a:prstGeom prst="rect">
             <a:avLst/>
           </a:prstGeom>
+          <a:solidFill>
+            <a:schemeClr val="bg1"/>
+          </a:solidFill>
+          <a:ln>
+            <a:solidFill>
+              <a:schemeClr val="tx1"/>
+            </a:solidFill>
+          </a:ln>
         </p:spPr>
         <p:style>
           <a:lnRef idx="2">
@@ -3559,10 +3638,18 @@
           <a:p>
             <a:pPr algn="ctr"/>
             <a:r>
-              <a:rPr lang="en-US" sz="1600" dirty="0" smtClean="0"/>
+              <a:rPr lang="en-US" sz="1600" dirty="0" smtClean="0">
+                <a:solidFill>
+                  <a:schemeClr val="tx1"/>
+                </a:solidFill>
+              </a:rPr>
               <a:t>Servo 1</a:t>
             </a:r>
-            <a:endParaRPr lang="en-US" sz="1600" dirty="0"/>
+            <a:endParaRPr lang="en-US" sz="1600" dirty="0">
+              <a:solidFill>
+                <a:schemeClr val="tx1"/>
+              </a:solidFill>
+            </a:endParaRPr>
           </a:p>
         </p:txBody>
       </p:sp>
@@ -3574,12 +3661,20 @@
         </p:nvSpPr>
         <p:spPr>
           <a:xfrm>
-            <a:off x="5811837" y="4243388"/>
-            <a:ext cx="1428750" cy="1028700"/>
+            <a:off x="4234557" y="3857348"/>
+            <a:ext cx="1428750" cy="1028701"/>
           </a:xfrm>
           <a:prstGeom prst="rect">
             <a:avLst/>
           </a:prstGeom>
+          <a:solidFill>
+            <a:schemeClr val="bg1"/>
+          </a:solidFill>
+          <a:ln>
+            <a:solidFill>
+              <a:schemeClr val="tx1"/>
+            </a:solidFill>
+          </a:ln>
         </p:spPr>
         <p:style>
           <a:lnRef idx="2">
@@ -3603,14 +3698,22 @@
           <a:p>
             <a:pPr algn="ctr"/>
             <a:r>
-              <a:rPr lang="en-US" sz="1600" dirty="0" smtClean="0"/>
+              <a:rPr lang="en-US" sz="1600" dirty="0" smtClean="0">
+                <a:solidFill>
+                  <a:schemeClr val="tx1"/>
+                </a:solidFill>
+              </a:rPr>
               <a:t>Voltage Limiting Circuit</a:t>
             </a:r>
           </a:p>
           <a:p>
             <a:pPr algn="ctr"/>
             <a:r>
-              <a:rPr lang="en-US" sz="1600" dirty="0" smtClean="0"/>
+              <a:rPr lang="en-US" sz="1600" dirty="0" smtClean="0">
+                <a:solidFill>
+                  <a:schemeClr val="tx1"/>
+                </a:solidFill>
+              </a:rPr>
               <a:t>6V to 5V</a:t>
             </a:r>
           </a:p>
@@ -3663,6 +3766,14 @@
           <a:prstGeom prst="rect">
             <a:avLst/>
           </a:prstGeom>
+          <a:solidFill>
+            <a:schemeClr val="bg1"/>
+          </a:solidFill>
+          <a:ln>
+            <a:solidFill>
+              <a:schemeClr val="tx1"/>
+            </a:solidFill>
+          </a:ln>
         </p:spPr>
         <p:style>
           <a:lnRef idx="2">
@@ -3686,10 +3797,18 @@
           <a:p>
             <a:pPr algn="ctr"/>
             <a:r>
-              <a:rPr lang="en-US" sz="1600" dirty="0" smtClean="0"/>
+              <a:rPr lang="en-US" sz="1600" dirty="0" smtClean="0">
+                <a:solidFill>
+                  <a:schemeClr val="tx1"/>
+                </a:solidFill>
+              </a:rPr>
               <a:t>Servo 2</a:t>
             </a:r>
-            <a:endParaRPr lang="en-US" sz="1600" dirty="0"/>
+            <a:endParaRPr lang="en-US" sz="1600" dirty="0">
+              <a:solidFill>
+                <a:schemeClr val="tx1"/>
+              </a:solidFill>
+            </a:endParaRPr>
           </a:p>
         </p:txBody>
       </p:sp>
@@ -3707,6 +3826,14 @@
           <a:prstGeom prst="rect">
             <a:avLst/>
           </a:prstGeom>
+          <a:solidFill>
+            <a:schemeClr val="bg1"/>
+          </a:solidFill>
+          <a:ln>
+            <a:solidFill>
+              <a:schemeClr val="tx1"/>
+            </a:solidFill>
+          </a:ln>
         </p:spPr>
         <p:style>
           <a:lnRef idx="2">
@@ -3730,13 +3857,518 @@
           <a:p>
             <a:pPr algn="ctr"/>
             <a:r>
-              <a:rPr lang="en-US" sz="1600" dirty="0" smtClean="0"/>
+              <a:rPr lang="en-US" sz="1600" dirty="0" smtClean="0">
+                <a:solidFill>
+                  <a:schemeClr val="tx1"/>
+                </a:solidFill>
+              </a:rPr>
               <a:t>Servo 3</a:t>
             </a:r>
-            <a:endParaRPr lang="en-US" sz="1600" dirty="0"/>
-          </a:p>
-        </p:txBody>
-      </p:sp>
+            <a:endParaRPr lang="en-US" sz="1600" dirty="0">
+              <a:solidFill>
+                <a:schemeClr val="tx1"/>
+              </a:solidFill>
+            </a:endParaRPr>
+          </a:p>
+        </p:txBody>
+      </p:sp>
+      <p:cxnSp>
+        <p:nvCxnSpPr>
+          <p:cNvPr id="3" name="Straight Arrow Connector 2"/>
+          <p:cNvCxnSpPr>
+            <a:stCxn id="15" idx="3"/>
+            <a:endCxn id="5" idx="1"/>
+          </p:cNvCxnSpPr>
+          <p:nvPr/>
+        </p:nvCxnSpPr>
+        <p:spPr>
+          <a:xfrm flipV="1">
+            <a:off x="1049337" y="1890514"/>
+            <a:ext cx="882453" cy="37346"/>
+          </a:xfrm>
+          <a:prstGeom prst="straightConnector1">
+            <a:avLst/>
+          </a:prstGeom>
+          <a:ln>
+            <a:headEnd type="none" w="med" len="med"/>
+            <a:tailEnd type="arrow" w="med" len="med"/>
+          </a:ln>
+        </p:spPr>
+        <p:style>
+          <a:lnRef idx="2">
+            <a:schemeClr val="dk1"/>
+          </a:lnRef>
+          <a:fillRef idx="0">
+            <a:schemeClr val="dk1"/>
+          </a:fillRef>
+          <a:effectRef idx="1">
+            <a:schemeClr val="dk1"/>
+          </a:effectRef>
+          <a:fontRef idx="minor">
+            <a:schemeClr val="tx1"/>
+          </a:fontRef>
+        </p:style>
+      </p:cxnSp>
+      <p:sp>
+        <p:nvSpPr>
+          <p:cNvPr id="15" name="TextBox 14"/>
+          <p:cNvSpPr txBox="1"/>
+          <p:nvPr/>
+        </p:nvSpPr>
+        <p:spPr>
+          <a:xfrm>
+            <a:off x="242706" y="1604694"/>
+            <a:ext cx="806631" cy="646331"/>
+          </a:xfrm>
+          <a:prstGeom prst="rect">
+            <a:avLst/>
+          </a:prstGeom>
+          <a:noFill/>
+        </p:spPr>
+        <p:txBody>
+          <a:bodyPr wrap="none" rtlCol="0">
+            <a:spAutoFit/>
+          </a:bodyPr>
+          <a:lstStyle/>
+          <a:p>
+            <a:r>
+              <a:rPr lang="en-US" dirty="0" smtClean="0"/>
+              <a:t>Base</a:t>
+            </a:r>
+          </a:p>
+          <a:p>
+            <a:r>
+              <a:rPr lang="en-US" dirty="0" smtClean="0"/>
+              <a:t>Angles</a:t>
+            </a:r>
+            <a:endParaRPr lang="en-US" dirty="0"/>
+          </a:p>
+        </p:txBody>
+      </p:sp>
+      <p:sp>
+        <p:nvSpPr>
+          <p:cNvPr id="16" name="TextBox 15"/>
+          <p:cNvSpPr txBox="1"/>
+          <p:nvPr/>
+        </p:nvSpPr>
+        <p:spPr>
+          <a:xfrm>
+            <a:off x="2057572" y="5945626"/>
+            <a:ext cx="1387303" cy="369332"/>
+          </a:xfrm>
+          <a:prstGeom prst="rect">
+            <a:avLst/>
+          </a:prstGeom>
+          <a:noFill/>
+        </p:spPr>
+        <p:txBody>
+          <a:bodyPr wrap="none" rtlCol="0">
+            <a:spAutoFit/>
+          </a:bodyPr>
+          <a:lstStyle/>
+          <a:p>
+            <a:r>
+              <a:rPr lang="en-US" dirty="0" smtClean="0"/>
+              <a:t>Power 6V AC</a:t>
+            </a:r>
+            <a:endParaRPr lang="en-US" dirty="0"/>
+          </a:p>
+        </p:txBody>
+      </p:sp>
+      <p:cxnSp>
+        <p:nvCxnSpPr>
+          <p:cNvPr id="17" name="Straight Arrow Connector 16"/>
+          <p:cNvCxnSpPr>
+            <a:stCxn id="16" idx="0"/>
+            <a:endCxn id="7" idx="2"/>
+          </p:cNvCxnSpPr>
+          <p:nvPr/>
+        </p:nvCxnSpPr>
+        <p:spPr>
+          <a:xfrm flipH="1" flipV="1">
+            <a:off x="2724978" y="4886049"/>
+            <a:ext cx="26246" cy="1059577"/>
+          </a:xfrm>
+          <a:prstGeom prst="straightConnector1">
+            <a:avLst/>
+          </a:prstGeom>
+          <a:ln>
+            <a:headEnd type="none" w="med" len="med"/>
+            <a:tailEnd type="arrow" w="med" len="med"/>
+          </a:ln>
+        </p:spPr>
+        <p:style>
+          <a:lnRef idx="2">
+            <a:schemeClr val="dk1"/>
+          </a:lnRef>
+          <a:fillRef idx="0">
+            <a:schemeClr val="dk1"/>
+          </a:fillRef>
+          <a:effectRef idx="1">
+            <a:schemeClr val="dk1"/>
+          </a:effectRef>
+          <a:fontRef idx="minor">
+            <a:schemeClr val="tx1"/>
+          </a:fontRef>
+        </p:style>
+      </p:cxnSp>
+      <p:cxnSp>
+        <p:nvCxnSpPr>
+          <p:cNvPr id="21" name="Straight Arrow Connector 20"/>
+          <p:cNvCxnSpPr>
+            <a:stCxn id="5" idx="3"/>
+            <a:endCxn id="6" idx="1"/>
+          </p:cNvCxnSpPr>
+          <p:nvPr/>
+        </p:nvCxnSpPr>
+        <p:spPr>
+          <a:xfrm flipV="1">
+            <a:off x="3360540" y="1885813"/>
+            <a:ext cx="3176785" cy="4701"/>
+          </a:xfrm>
+          <a:prstGeom prst="straightConnector1">
+            <a:avLst/>
+          </a:prstGeom>
+          <a:ln>
+            <a:headEnd type="none" w="med" len="med"/>
+            <a:tailEnd type="arrow" w="med" len="med"/>
+          </a:ln>
+        </p:spPr>
+        <p:style>
+          <a:lnRef idx="2">
+            <a:schemeClr val="dk1"/>
+          </a:lnRef>
+          <a:fillRef idx="0">
+            <a:schemeClr val="dk1"/>
+          </a:fillRef>
+          <a:effectRef idx="1">
+            <a:schemeClr val="dk1"/>
+          </a:effectRef>
+          <a:fontRef idx="minor">
+            <a:schemeClr val="tx1"/>
+          </a:fontRef>
+        </p:style>
+      </p:cxnSp>
+      <p:sp>
+        <p:nvSpPr>
+          <p:cNvPr id="62" name="Rectangle 61"/>
+          <p:cNvSpPr/>
+          <p:nvPr/>
+        </p:nvSpPr>
+        <p:spPr>
+          <a:xfrm>
+            <a:off x="6537325" y="2777781"/>
+            <a:ext cx="1428750" cy="1028700"/>
+          </a:xfrm>
+          <a:prstGeom prst="rect">
+            <a:avLst/>
+          </a:prstGeom>
+          <a:solidFill>
+            <a:schemeClr val="bg1"/>
+          </a:solidFill>
+          <a:ln>
+            <a:solidFill>
+              <a:schemeClr val="tx1"/>
+            </a:solidFill>
+          </a:ln>
+        </p:spPr>
+        <p:style>
+          <a:lnRef idx="2">
+            <a:schemeClr val="accent1">
+              <a:shade val="50000"/>
+            </a:schemeClr>
+          </a:lnRef>
+          <a:fillRef idx="1">
+            <a:schemeClr val="accent1"/>
+          </a:fillRef>
+          <a:effectRef idx="0">
+            <a:schemeClr val="accent1"/>
+          </a:effectRef>
+          <a:fontRef idx="minor">
+            <a:schemeClr val="lt1"/>
+          </a:fontRef>
+        </p:style>
+        <p:txBody>
+          <a:bodyPr rtlCol="0" anchor="ctr"/>
+          <a:lstStyle/>
+          <a:p>
+            <a:pPr algn="ctr"/>
+            <a:r>
+              <a:rPr lang="en-US" sz="1600" dirty="0" smtClean="0">
+                <a:solidFill>
+                  <a:schemeClr val="tx1"/>
+                </a:solidFill>
+              </a:rPr>
+              <a:t>LED Calculations</a:t>
+            </a:r>
+            <a:endParaRPr lang="en-US" sz="1600" dirty="0">
+              <a:solidFill>
+                <a:schemeClr val="tx1"/>
+              </a:solidFill>
+            </a:endParaRPr>
+          </a:p>
+        </p:txBody>
+      </p:sp>
+      <p:cxnSp>
+        <p:nvCxnSpPr>
+          <p:cNvPr id="67" name="Straight Arrow Connector 66"/>
+          <p:cNvCxnSpPr>
+            <a:stCxn id="10" idx="3"/>
+            <a:endCxn id="8" idx="1"/>
+          </p:cNvCxnSpPr>
+          <p:nvPr/>
+        </p:nvCxnSpPr>
+        <p:spPr>
+          <a:xfrm>
+            <a:off x="5663307" y="4371699"/>
+            <a:ext cx="3490215" cy="0"/>
+          </a:xfrm>
+          <a:prstGeom prst="straightConnector1">
+            <a:avLst/>
+          </a:prstGeom>
+          <a:ln>
+            <a:tailEnd type="triangle"/>
+          </a:ln>
+        </p:spPr>
+        <p:style>
+          <a:lnRef idx="2">
+            <a:schemeClr val="accent1"/>
+          </a:lnRef>
+          <a:fillRef idx="0">
+            <a:schemeClr val="accent1"/>
+          </a:fillRef>
+          <a:effectRef idx="1">
+            <a:schemeClr val="accent1"/>
+          </a:effectRef>
+          <a:fontRef idx="minor">
+            <a:schemeClr val="tx1"/>
+          </a:fontRef>
+        </p:style>
+      </p:cxnSp>
+      <p:cxnSp>
+        <p:nvCxnSpPr>
+          <p:cNvPr id="85" name="Elbow Connector 84"/>
+          <p:cNvCxnSpPr>
+            <a:stCxn id="5" idx="3"/>
+            <a:endCxn id="62" idx="1"/>
+          </p:cNvCxnSpPr>
+          <p:nvPr/>
+        </p:nvCxnSpPr>
+        <p:spPr>
+          <a:xfrm>
+            <a:off x="3360540" y="1890514"/>
+            <a:ext cx="3176785" cy="1401617"/>
+          </a:xfrm>
+          <a:prstGeom prst="bentConnector3">
+            <a:avLst/>
+          </a:prstGeom>
+          <a:ln>
+            <a:tailEnd type="triangle"/>
+          </a:ln>
+        </p:spPr>
+        <p:style>
+          <a:lnRef idx="2">
+            <a:schemeClr val="accent1"/>
+          </a:lnRef>
+          <a:fillRef idx="0">
+            <a:schemeClr val="accent1"/>
+          </a:fillRef>
+          <a:effectRef idx="1">
+            <a:schemeClr val="accent1"/>
+          </a:effectRef>
+          <a:fontRef idx="minor">
+            <a:schemeClr val="tx1"/>
+          </a:fontRef>
+        </p:style>
+      </p:cxnSp>
+      <p:cxnSp>
+        <p:nvCxnSpPr>
+          <p:cNvPr id="94" name="Straight Arrow Connector 93"/>
+          <p:cNvCxnSpPr>
+            <a:stCxn id="6" idx="3"/>
+            <a:endCxn id="9" idx="1"/>
+          </p:cNvCxnSpPr>
+          <p:nvPr/>
+        </p:nvCxnSpPr>
+        <p:spPr>
+          <a:xfrm flipV="1">
+            <a:off x="7966075" y="1478755"/>
+            <a:ext cx="1577972" cy="407058"/>
+          </a:xfrm>
+          <a:prstGeom prst="straightConnector1">
+            <a:avLst/>
+          </a:prstGeom>
+          <a:ln>
+            <a:headEnd type="none" w="med" len="med"/>
+            <a:tailEnd type="arrow" w="med" len="med"/>
+          </a:ln>
+        </p:spPr>
+        <p:style>
+          <a:lnRef idx="2">
+            <a:schemeClr val="dk1"/>
+          </a:lnRef>
+          <a:fillRef idx="0">
+            <a:schemeClr val="dk1"/>
+          </a:fillRef>
+          <a:effectRef idx="1">
+            <a:schemeClr val="dk1"/>
+          </a:effectRef>
+          <a:fontRef idx="minor">
+            <a:schemeClr val="tx1"/>
+          </a:fontRef>
+        </p:style>
+      </p:cxnSp>
+      <p:cxnSp>
+        <p:nvCxnSpPr>
+          <p:cNvPr id="96" name="Straight Arrow Connector 95"/>
+          <p:cNvCxnSpPr>
+            <a:stCxn id="6" idx="3"/>
+            <a:endCxn id="12" idx="1"/>
+          </p:cNvCxnSpPr>
+          <p:nvPr/>
+        </p:nvCxnSpPr>
+        <p:spPr>
+          <a:xfrm>
+            <a:off x="7966075" y="1885813"/>
+            <a:ext cx="1577972" cy="128723"/>
+          </a:xfrm>
+          <a:prstGeom prst="straightConnector1">
+            <a:avLst/>
+          </a:prstGeom>
+          <a:ln>
+            <a:headEnd type="none" w="med" len="med"/>
+            <a:tailEnd type="arrow" w="med" len="med"/>
+          </a:ln>
+        </p:spPr>
+        <p:style>
+          <a:lnRef idx="2">
+            <a:schemeClr val="accent2"/>
+          </a:lnRef>
+          <a:fillRef idx="0">
+            <a:schemeClr val="accent2"/>
+          </a:fillRef>
+          <a:effectRef idx="1">
+            <a:schemeClr val="accent2"/>
+          </a:effectRef>
+          <a:fontRef idx="minor">
+            <a:schemeClr val="tx1"/>
+          </a:fontRef>
+        </p:style>
+      </p:cxnSp>
+      <p:cxnSp>
+        <p:nvCxnSpPr>
+          <p:cNvPr id="98" name="Straight Arrow Connector 97"/>
+          <p:cNvCxnSpPr>
+            <a:stCxn id="6" idx="3"/>
+            <a:endCxn id="13" idx="1"/>
+          </p:cNvCxnSpPr>
+          <p:nvPr/>
+        </p:nvCxnSpPr>
+        <p:spPr>
+          <a:xfrm>
+            <a:off x="7966075" y="1885813"/>
+            <a:ext cx="1577972" cy="650212"/>
+          </a:xfrm>
+          <a:prstGeom prst="straightConnector1">
+            <a:avLst/>
+          </a:prstGeom>
+          <a:ln>
+            <a:tailEnd type="triangle"/>
+          </a:ln>
+        </p:spPr>
+        <p:style>
+          <a:lnRef idx="2">
+            <a:schemeClr val="accent1"/>
+          </a:lnRef>
+          <a:fillRef idx="0">
+            <a:schemeClr val="accent1"/>
+          </a:fillRef>
+          <a:effectRef idx="1">
+            <a:schemeClr val="accent1"/>
+          </a:effectRef>
+          <a:fontRef idx="minor">
+            <a:schemeClr val="tx1"/>
+          </a:fontRef>
+        </p:style>
+      </p:cxnSp>
+      <p:cxnSp>
+        <p:nvCxnSpPr>
+          <p:cNvPr id="109" name="Straight Arrow Connector 108"/>
+          <p:cNvCxnSpPr>
+            <a:stCxn id="7" idx="3"/>
+            <a:endCxn id="10" idx="1"/>
+          </p:cNvCxnSpPr>
+          <p:nvPr/>
+        </p:nvCxnSpPr>
+        <p:spPr>
+          <a:xfrm>
+            <a:off x="3439353" y="4371699"/>
+            <a:ext cx="795204" cy="0"/>
+          </a:xfrm>
+          <a:prstGeom prst="straightConnector1">
+            <a:avLst/>
+          </a:prstGeom>
+          <a:ln>
+            <a:tailEnd type="triangle"/>
+          </a:ln>
+        </p:spPr>
+        <p:style>
+          <a:lnRef idx="2">
+            <a:schemeClr val="accent1"/>
+          </a:lnRef>
+          <a:fillRef idx="0">
+            <a:schemeClr val="accent1"/>
+          </a:fillRef>
+          <a:effectRef idx="1">
+            <a:schemeClr val="accent1"/>
+          </a:effectRef>
+          <a:fontRef idx="minor">
+            <a:schemeClr val="tx1"/>
+          </a:fontRef>
+        </p:style>
+      </p:cxnSp>
+      <p:cxnSp>
+        <p:nvCxnSpPr>
+          <p:cNvPr id="115" name="Elbow Connector 114"/>
+          <p:cNvCxnSpPr>
+            <a:stCxn id="62" idx="2"/>
+            <a:endCxn id="8" idx="1"/>
+          </p:cNvCxnSpPr>
+          <p:nvPr/>
+        </p:nvCxnSpPr>
+        <p:spPr>
+          <a:xfrm rot="16200000" flipH="1">
+            <a:off x="7920002" y="3138179"/>
+            <a:ext cx="565218" cy="1901822"/>
+          </a:xfrm>
+          <a:prstGeom prst="bentConnector2">
+            <a:avLst/>
+          </a:prstGeom>
+          <a:ln w="9525" cap="flat" cmpd="sng" algn="ctr">
+            <a:solidFill>
+              <a:schemeClr val="dk1"/>
+            </a:solidFill>
+            <a:prstDash val="solid"/>
+            <a:round/>
+            <a:headEnd type="none" w="med" len="med"/>
+            <a:tailEnd type="arrow" w="med" len="med"/>
+          </a:ln>
+        </p:spPr>
+        <p:style>
+          <a:lnRef idx="0">
+            <a:scrgbClr r="0" g="0" b="0"/>
+          </a:lnRef>
+          <a:fillRef idx="0">
+            <a:scrgbClr r="0" g="0" b="0"/>
+          </a:fillRef>
+          <a:effectRef idx="0">
+            <a:scrgbClr r="0" g="0" b="0"/>
+          </a:effectRef>
+          <a:fontRef idx="minor">
+            <a:schemeClr val="tx1"/>
+          </a:fontRef>
+        </p:style>
+      </p:cxnSp>
     </p:spTree>
     <p:extLst>
       <p:ext uri="{BB962C8B-B14F-4D97-AF65-F5344CB8AC3E}">

</xml_diff>